<commit_message>
FY2020Q3 content refresh & port module to MS Learn
</commit_message>
<xml_diff>
--- a/01-intro.pptx
+++ b/01-intro.pptx
@@ -3234,7 +3234,7 @@
   <dgm:whole/>
   <dgm:extLst>
     <a:ext uri="http://schemas.microsoft.com/office/drawing/2008/diagram">
-      <dsp:dataModelExt xmlns:dsp="http://schemas.microsoft.com/office/drawing/2008/diagram" relId="rId6" minVer="http://schemas.openxmlformats.org/drawingml/2006/diagram"/>
+      <dsp:dataModelExt xmlns:dsp="http://schemas.microsoft.com/office/drawing/2008/diagram" relId="rId7" minVer="http://schemas.openxmlformats.org/drawingml/2006/diagram"/>
     </a:ext>
   </dgm:extLst>
 </dgm:dataModel>
@@ -3789,7 +3789,7 @@
   <dgm:whole/>
   <dgm:extLst>
     <a:ext uri="http://schemas.microsoft.com/office/drawing/2008/diagram">
-      <dsp:dataModelExt xmlns:dsp="http://schemas.microsoft.com/office/drawing/2008/diagram" relId="rId6" minVer="http://schemas.openxmlformats.org/drawingml/2006/diagram"/>
+      <dsp:dataModelExt xmlns:dsp="http://schemas.microsoft.com/office/drawing/2008/diagram" relId="rId7" minVer="http://schemas.openxmlformats.org/drawingml/2006/diagram"/>
     </a:ext>
   </dgm:extLst>
 </dgm:dataModel>
@@ -4367,7 +4367,7 @@
   <dgm:whole/>
   <dgm:extLst>
     <a:ext uri="http://schemas.microsoft.com/office/drawing/2008/diagram">
-      <dsp:dataModelExt xmlns:dsp="http://schemas.microsoft.com/office/drawing/2008/diagram" relId="rId6" minVer="http://schemas.openxmlformats.org/drawingml/2006/diagram"/>
+      <dsp:dataModelExt xmlns:dsp="http://schemas.microsoft.com/office/drawing/2008/diagram" relId="rId7" minVer="http://schemas.openxmlformats.org/drawingml/2006/diagram"/>
     </a:ext>
   </dgm:extLst>
 </dgm:dataModel>
@@ -9827,7 +9827,7 @@
               <a:rPr lang="en-US" smtClean="0">
                 <a:latin typeface="Segoe UI" pitchFamily="34" charset="0"/>
               </a:rPr>
-              <a:t>3/14/19 1:45 PM</a:t>
+              <a:t>3/6/20 3:29 PM</a:t>
             </a:fld>
             <a:endParaRPr lang="en-US" dirty="0">
               <a:latin typeface="Segoe UI" pitchFamily="34" charset="0"/>
@@ -10124,7 +10124,7 @@
           <a:p>
             <a:fld id="{D18B56EA-E28F-4F92-9F16-7A6F2501B303}" type="datetime8">
               <a:rPr lang="en-US" smtClean="0"/>
-              <a:t>3/14/19 1:45 PM</a:t>
+              <a:t>3/6/20 3:29 PM</a:t>
             </a:fld>
             <a:endParaRPr lang="en-US" dirty="0"/>
           </a:p>
@@ -10507,7 +10507,7 @@
           <a:p>
             <a:fld id="{D18B56EA-E28F-4F92-9F16-7A6F2501B303}" type="datetime8">
               <a:rPr lang="en-US" smtClean="0"/>
-              <a:t>3/14/19 1:46 PM</a:t>
+              <a:t>3/6/20 3:29 PM</a:t>
             </a:fld>
             <a:endParaRPr lang="en-US" dirty="0"/>
           </a:p>
@@ -10541,6 +10541,368 @@
     <p:extLst>
       <p:ext uri="{BB962C8B-B14F-4D97-AF65-F5344CB8AC3E}">
         <p14:creationId xmlns:p14="http://schemas.microsoft.com/office/powerpoint/2010/main" val="909857904"/>
+      </p:ext>
+    </p:extLst>
+  </p:cSld>
+  <p:clrMapOvr>
+    <a:masterClrMapping/>
+  </p:clrMapOvr>
+</p:notes>
+</file>
+
+<file path=ppt/notesSlides/notesSlide10.xml><?xml version="1.0" encoding="utf-8"?>
+<p:notes xmlns:a="http://schemas.openxmlformats.org/drawingml/2006/main" xmlns:r="http://schemas.openxmlformats.org/officeDocument/2006/relationships" xmlns:p="http://schemas.openxmlformats.org/presentationml/2006/main">
+  <p:cSld>
+    <p:spTree>
+      <p:nvGrpSpPr>
+        <p:cNvPr id="1" name=""/>
+        <p:cNvGrpSpPr/>
+        <p:nvPr/>
+      </p:nvGrpSpPr>
+      <p:grpSpPr>
+        <a:xfrm>
+          <a:off x="0" y="0"/>
+          <a:ext cx="0" cy="0"/>
+          <a:chOff x="0" y="0"/>
+          <a:chExt cx="0" cy="0"/>
+        </a:xfrm>
+      </p:grpSpPr>
+      <p:sp>
+        <p:nvSpPr>
+          <p:cNvPr id="2" name="Slide Image Placeholder 1"/>
+          <p:cNvSpPr>
+            <a:spLocks noGrp="1" noRot="1" noChangeAspect="1"/>
+          </p:cNvSpPr>
+          <p:nvPr>
+            <p:ph type="sldImg"/>
+          </p:nvPr>
+        </p:nvSpPr>
+        <p:spPr/>
+      </p:sp>
+      <p:sp>
+        <p:nvSpPr>
+          <p:cNvPr id="3" name="Notes Placeholder 2"/>
+          <p:cNvSpPr>
+            <a:spLocks noGrp="1"/>
+          </p:cNvSpPr>
+          <p:nvPr>
+            <p:ph type="body" idx="1"/>
+          </p:nvPr>
+        </p:nvSpPr>
+        <p:spPr/>
+        <p:txBody>
+          <a:bodyPr/>
+          <a:lstStyle/>
+          <a:p>
+            <a:endParaRPr lang="en-US"/>
+          </a:p>
+        </p:txBody>
+      </p:sp>
+      <p:sp>
+        <p:nvSpPr>
+          <p:cNvPr id="4" name="Header Placeholder 3"/>
+          <p:cNvSpPr>
+            <a:spLocks noGrp="1"/>
+          </p:cNvSpPr>
+          <p:nvPr>
+            <p:ph type="hdr" sz="quarter" idx="10"/>
+          </p:nvPr>
+        </p:nvSpPr>
+        <p:spPr/>
+        <p:txBody>
+          <a:bodyPr/>
+          <a:lstStyle/>
+          <a:p>
+            <a:endParaRPr lang="en-US" dirty="0"/>
+          </a:p>
+        </p:txBody>
+      </p:sp>
+      <p:sp>
+        <p:nvSpPr>
+          <p:cNvPr id="5" name="Footer Placeholder 4"/>
+          <p:cNvSpPr>
+            <a:spLocks noGrp="1"/>
+          </p:cNvSpPr>
+          <p:nvPr>
+            <p:ph type="ftr" sz="quarter" idx="11"/>
+          </p:nvPr>
+        </p:nvSpPr>
+        <p:spPr/>
+        <p:txBody>
+          <a:bodyPr/>
+          <a:lstStyle/>
+          <a:p>
+            <a:pPr defTabSz="914099" eaLnBrk="0" hangingPunct="0"/>
+            <a:r>
+              <a:rPr lang="en-US" sz="400">
+                <a:gradFill>
+                  <a:gsLst>
+                    <a:gs pos="0">
+                      <a:prstClr val="black"/>
+                    </a:gs>
+                    <a:gs pos="100000">
+                      <a:prstClr val="black"/>
+                    </a:gs>
+                  </a:gsLst>
+                  <a:lin ang="5400000" scaled="0"/>
+                </a:gradFill>
+                <a:latin typeface="Segoe UI" pitchFamily="34" charset="0"/>
+                <a:ea typeface="Segoe UI" pitchFamily="34" charset="0"/>
+                <a:cs typeface="Segoe UI" pitchFamily="34" charset="0"/>
+              </a:rPr>
+              <a:t>© Microsoft Corporation. All rights reserved. MICROSOFT MAKES NO WARRANTIES, EXPRESS, IMPLIED OR STATUTORY, AS TO THE INFORMATION IN THIS PRESENTATION.</a:t>
+            </a:r>
+            <a:endParaRPr lang="en-US" sz="400" dirty="0">
+              <a:gradFill>
+                <a:gsLst>
+                  <a:gs pos="0">
+                    <a:prstClr val="black"/>
+                  </a:gs>
+                  <a:gs pos="100000">
+                    <a:prstClr val="black"/>
+                  </a:gs>
+                </a:gsLst>
+                <a:lin ang="5400000" scaled="0"/>
+              </a:gradFill>
+              <a:latin typeface="Segoe UI" pitchFamily="34" charset="0"/>
+              <a:ea typeface="Segoe UI" pitchFamily="34" charset="0"/>
+              <a:cs typeface="Segoe UI" pitchFamily="34" charset="0"/>
+            </a:endParaRPr>
+          </a:p>
+        </p:txBody>
+      </p:sp>
+      <p:sp>
+        <p:nvSpPr>
+          <p:cNvPr id="6" name="Date Placeholder 5"/>
+          <p:cNvSpPr>
+            <a:spLocks noGrp="1"/>
+          </p:cNvSpPr>
+          <p:nvPr>
+            <p:ph type="dt" idx="12"/>
+          </p:nvPr>
+        </p:nvSpPr>
+        <p:spPr/>
+        <p:txBody>
+          <a:bodyPr/>
+          <a:lstStyle/>
+          <a:p>
+            <a:fld id="{D18B56EA-E28F-4F92-9F16-7A6F2501B303}" type="datetime8">
+              <a:rPr lang="en-US" smtClean="0"/>
+              <a:t>3/6/20 3:29 PM</a:t>
+            </a:fld>
+            <a:endParaRPr lang="en-US" dirty="0"/>
+          </a:p>
+        </p:txBody>
+      </p:sp>
+      <p:sp>
+        <p:nvSpPr>
+          <p:cNvPr id="7" name="Slide Number Placeholder 6"/>
+          <p:cNvSpPr>
+            <a:spLocks noGrp="1"/>
+          </p:cNvSpPr>
+          <p:nvPr>
+            <p:ph type="sldNum" sz="quarter" idx="13"/>
+          </p:nvPr>
+        </p:nvSpPr>
+        <p:spPr/>
+        <p:txBody>
+          <a:bodyPr/>
+          <a:lstStyle/>
+          <a:p>
+            <a:fld id="{B4008EB6-D09E-4580-8CD6-DDB14511944F}" type="slidenum">
+              <a:rPr lang="en-US" smtClean="0"/>
+              <a:pPr/>
+              <a:t>11</a:t>
+            </a:fld>
+            <a:endParaRPr lang="en-US" dirty="0"/>
+          </a:p>
+        </p:txBody>
+      </p:sp>
+    </p:spTree>
+    <p:extLst>
+      <p:ext uri="{BB962C8B-B14F-4D97-AF65-F5344CB8AC3E}">
+        <p14:creationId xmlns:p14="http://schemas.microsoft.com/office/powerpoint/2010/main" val="2510823477"/>
+      </p:ext>
+    </p:extLst>
+  </p:cSld>
+  <p:clrMapOvr>
+    <a:masterClrMapping/>
+  </p:clrMapOvr>
+</p:notes>
+</file>
+
+<file path=ppt/notesSlides/notesSlide11.xml><?xml version="1.0" encoding="utf-8"?>
+<p:notes xmlns:a="http://schemas.openxmlformats.org/drawingml/2006/main" xmlns:r="http://schemas.openxmlformats.org/officeDocument/2006/relationships" xmlns:p="http://schemas.openxmlformats.org/presentationml/2006/main">
+  <p:cSld>
+    <p:spTree>
+      <p:nvGrpSpPr>
+        <p:cNvPr id="1" name=""/>
+        <p:cNvGrpSpPr/>
+        <p:nvPr/>
+      </p:nvGrpSpPr>
+      <p:grpSpPr>
+        <a:xfrm>
+          <a:off x="0" y="0"/>
+          <a:ext cx="0" cy="0"/>
+          <a:chOff x="0" y="0"/>
+          <a:chExt cx="0" cy="0"/>
+        </a:xfrm>
+      </p:grpSpPr>
+      <p:sp>
+        <p:nvSpPr>
+          <p:cNvPr id="2" name="Slide Image Placeholder 1"/>
+          <p:cNvSpPr>
+            <a:spLocks noGrp="1" noRot="1" noChangeAspect="1"/>
+          </p:cNvSpPr>
+          <p:nvPr>
+            <p:ph type="sldImg"/>
+          </p:nvPr>
+        </p:nvSpPr>
+        <p:spPr/>
+      </p:sp>
+      <p:sp>
+        <p:nvSpPr>
+          <p:cNvPr id="3" name="Notes Placeholder 2"/>
+          <p:cNvSpPr>
+            <a:spLocks noGrp="1"/>
+          </p:cNvSpPr>
+          <p:nvPr>
+            <p:ph type="body" idx="1"/>
+          </p:nvPr>
+        </p:nvSpPr>
+        <p:spPr/>
+        <p:txBody>
+          <a:bodyPr/>
+          <a:lstStyle/>
+          <a:p>
+            <a:endParaRPr lang="en-US"/>
+          </a:p>
+        </p:txBody>
+      </p:sp>
+      <p:sp>
+        <p:nvSpPr>
+          <p:cNvPr id="4" name="Header Placeholder 3"/>
+          <p:cNvSpPr>
+            <a:spLocks noGrp="1"/>
+          </p:cNvSpPr>
+          <p:nvPr>
+            <p:ph type="hdr" sz="quarter" idx="10"/>
+          </p:nvPr>
+        </p:nvSpPr>
+        <p:spPr/>
+        <p:txBody>
+          <a:bodyPr/>
+          <a:lstStyle/>
+          <a:p>
+            <a:endParaRPr lang="en-US" dirty="0"/>
+          </a:p>
+        </p:txBody>
+      </p:sp>
+      <p:sp>
+        <p:nvSpPr>
+          <p:cNvPr id="5" name="Footer Placeholder 4"/>
+          <p:cNvSpPr>
+            <a:spLocks noGrp="1"/>
+          </p:cNvSpPr>
+          <p:nvPr>
+            <p:ph type="ftr" sz="quarter" idx="11"/>
+          </p:nvPr>
+        </p:nvSpPr>
+        <p:spPr/>
+        <p:txBody>
+          <a:bodyPr/>
+          <a:lstStyle/>
+          <a:p>
+            <a:pPr defTabSz="914099" eaLnBrk="0" hangingPunct="0"/>
+            <a:r>
+              <a:rPr lang="en-US" sz="400">
+                <a:gradFill>
+                  <a:gsLst>
+                    <a:gs pos="0">
+                      <a:prstClr val="black"/>
+                    </a:gs>
+                    <a:gs pos="100000">
+                      <a:prstClr val="black"/>
+                    </a:gs>
+                  </a:gsLst>
+                  <a:lin ang="5400000" scaled="0"/>
+                </a:gradFill>
+                <a:latin typeface="Segoe UI" pitchFamily="34" charset="0"/>
+                <a:ea typeface="Segoe UI" pitchFamily="34" charset="0"/>
+                <a:cs typeface="Segoe UI" pitchFamily="34" charset="0"/>
+              </a:rPr>
+              <a:t>© Microsoft Corporation. All rights reserved. MICROSOFT MAKES NO WARRANTIES, EXPRESS, IMPLIED OR STATUTORY, AS TO THE INFORMATION IN THIS PRESENTATION.</a:t>
+            </a:r>
+            <a:endParaRPr lang="en-US" sz="400" dirty="0">
+              <a:gradFill>
+                <a:gsLst>
+                  <a:gs pos="0">
+                    <a:prstClr val="black"/>
+                  </a:gs>
+                  <a:gs pos="100000">
+                    <a:prstClr val="black"/>
+                  </a:gs>
+                </a:gsLst>
+                <a:lin ang="5400000" scaled="0"/>
+              </a:gradFill>
+              <a:latin typeface="Segoe UI" pitchFamily="34" charset="0"/>
+              <a:ea typeface="Segoe UI" pitchFamily="34" charset="0"/>
+              <a:cs typeface="Segoe UI" pitchFamily="34" charset="0"/>
+            </a:endParaRPr>
+          </a:p>
+        </p:txBody>
+      </p:sp>
+      <p:sp>
+        <p:nvSpPr>
+          <p:cNvPr id="6" name="Date Placeholder 5"/>
+          <p:cNvSpPr>
+            <a:spLocks noGrp="1"/>
+          </p:cNvSpPr>
+          <p:nvPr>
+            <p:ph type="dt" idx="12"/>
+          </p:nvPr>
+        </p:nvSpPr>
+        <p:spPr/>
+        <p:txBody>
+          <a:bodyPr/>
+          <a:lstStyle/>
+          <a:p>
+            <a:fld id="{D18B56EA-E28F-4F92-9F16-7A6F2501B303}" type="datetime8">
+              <a:rPr lang="en-US" smtClean="0"/>
+              <a:t>3/6/20 3:29 PM</a:t>
+            </a:fld>
+            <a:endParaRPr lang="en-US" dirty="0"/>
+          </a:p>
+        </p:txBody>
+      </p:sp>
+      <p:sp>
+        <p:nvSpPr>
+          <p:cNvPr id="7" name="Slide Number Placeholder 6"/>
+          <p:cNvSpPr>
+            <a:spLocks noGrp="1"/>
+          </p:cNvSpPr>
+          <p:nvPr>
+            <p:ph type="sldNum" sz="quarter" idx="13"/>
+          </p:nvPr>
+        </p:nvSpPr>
+        <p:spPr/>
+        <p:txBody>
+          <a:bodyPr/>
+          <a:lstStyle/>
+          <a:p>
+            <a:fld id="{B4008EB6-D09E-4580-8CD6-DDB14511944F}" type="slidenum">
+              <a:rPr lang="en-US" smtClean="0"/>
+              <a:pPr/>
+              <a:t>12</a:t>
+            </a:fld>
+            <a:endParaRPr lang="en-US" dirty="0"/>
+          </a:p>
+        </p:txBody>
+      </p:sp>
+    </p:spTree>
+    <p:extLst>
+      <p:ext uri="{BB962C8B-B14F-4D97-AF65-F5344CB8AC3E}">
+        <p14:creationId xmlns:p14="http://schemas.microsoft.com/office/powerpoint/2010/main" val="1685519606"/>
       </p:ext>
     </p:extLst>
   </p:cSld>
@@ -10594,7 +10956,10 @@
           <a:bodyPr/>
           <a:lstStyle/>
           <a:p>
-            <a:endParaRPr lang="en-US"/>
+            <a:r>
+              <a:rPr lang="en-US" dirty="0"/>
+              <a:t>In this unit, you'll learn how to package and deploy SharePoint Framework solutions to production.</a:t>
+            </a:r>
           </a:p>
         </p:txBody>
       </p:sp>
@@ -10688,7 +11053,7 @@
           <a:p>
             <a:fld id="{D18B56EA-E28F-4F92-9F16-7A6F2501B303}" type="datetime8">
               <a:rPr lang="en-US" smtClean="0"/>
-              <a:t>3/14/19 1:45 PM</a:t>
+              <a:t>3/6/20 5:26 PM</a:t>
             </a:fld>
             <a:endParaRPr lang="en-US" dirty="0"/>
           </a:p>
@@ -10775,7 +11140,55 @@
           <a:bodyPr/>
           <a:lstStyle/>
           <a:p>
+            <a:r>
+              <a:rPr lang="en-US" dirty="0"/>
+              <a:t>Let's start by looking at the SharePoint Framework deployment artifacts to understand the different things required for SharePoint Framework solutions to work in production. </a:t>
+            </a:r>
+          </a:p>
+          <a:p>
             <a:endParaRPr lang="en-US" dirty="0"/>
+          </a:p>
+          <a:p>
+            <a:r>
+              <a:rPr lang="en-US" dirty="0"/>
+              <a:t>There are two different kinds of files:</a:t>
+            </a:r>
+          </a:p>
+          <a:p>
+            <a:endParaRPr lang="en-US" dirty="0"/>
+          </a:p>
+          <a:p>
+            <a:r>
+              <a:rPr lang="en-US" dirty="0"/>
+              <a:t>- **Installation and registration**: The installation and registration files are included in SharePoint packages deployed to the SharePoint App Catalogs. These files make SharePoint aware of the components included in the packages.</a:t>
+            </a:r>
+          </a:p>
+          <a:p>
+            <a:endParaRPr lang="en-US" dirty="0"/>
+          </a:p>
+          <a:p>
+            <a:r>
+              <a:rPr lang="en-US" dirty="0"/>
+              <a:t>    These files include an app manifest file, feature framework files, and other files that SharePoint needs to provision the components. It doesn't include files that make the application run.</a:t>
+            </a:r>
+          </a:p>
+          <a:p>
+            <a:endParaRPr lang="en-US" dirty="0"/>
+          </a:p>
+          <a:p>
+            <a:r>
+              <a:rPr lang="en-US" dirty="0"/>
+              <a:t>- **Component runtime files and dependencies**: These are the files that are needed to run the SharePoint Framework component once it's been deployed and installed in a SharePoint environment. Any dependencies your component uses, such as third-party web framework libraries, can optionally be included in the component's bundle or loaded at runtime from an external CDN. The component's manifest file defines all dependencies the component requires to be present on the page prior to it loading and running.</a:t>
+            </a:r>
+          </a:p>
+          <a:p>
+            <a:endParaRPr lang="en-US" dirty="0"/>
+          </a:p>
+          <a:p>
+            <a:r>
+              <a:rPr lang="en-US" dirty="0"/>
+              <a:t>    These files include JavaScript bundles of your components, images, CSS files, and JavaScript libraries or assets your component depends on.</a:t>
+            </a:r>
           </a:p>
         </p:txBody>
       </p:sp>
@@ -10937,7 +11350,287 @@
           <a:bodyPr/>
           <a:lstStyle/>
           <a:p>
-            <a:endParaRPr lang="en-US"/>
+            <a:r>
+              <a:rPr lang="en-US" dirty="0"/>
+              <a:t>SharePoint Framework projects are deployed to production using *packages*. A package filename ends with the **</a:t>
+            </a:r>
+            <a:r>
+              <a:rPr lang="en-US" dirty="0" err="1"/>
+              <a:t>sppkg</a:t>
+            </a:r>
+            <a:r>
+              <a:rPr lang="en-US" dirty="0"/>
+              <a:t>** extension. There are three steps to creating the package.</a:t>
+            </a:r>
+          </a:p>
+          <a:p>
+            <a:endParaRPr lang="en-US" dirty="0"/>
+          </a:p>
+          <a:p>
+            <a:r>
+              <a:rPr lang="en-US" dirty="0"/>
+              <a:t>### Build</a:t>
+            </a:r>
+          </a:p>
+          <a:p>
+            <a:endParaRPr lang="en-US" dirty="0"/>
+          </a:p>
+          <a:p>
+            <a:r>
+              <a:rPr lang="en-US" dirty="0"/>
+              <a:t>The build phase </a:t>
+            </a:r>
+            <a:r>
+              <a:rPr lang="en-US" dirty="0" err="1"/>
+              <a:t>transpiles</a:t>
+            </a:r>
+            <a:r>
+              <a:rPr lang="en-US" dirty="0"/>
+              <a:t> all TypeScript to </a:t>
+            </a:r>
+            <a:r>
+              <a:rPr lang="en-US" dirty="0" err="1"/>
+              <a:t>Javascript</a:t>
+            </a:r>
+            <a:r>
+              <a:rPr lang="en-US" dirty="0"/>
+              <a:t>, generates TypeScript type declarations from you TypeScript files, and </a:t>
+            </a:r>
+            <a:r>
+              <a:rPr lang="en-US" dirty="0" err="1"/>
+              <a:t>transpiles</a:t>
+            </a:r>
+            <a:r>
+              <a:rPr lang="en-US" dirty="0"/>
+              <a:t> SCSS files to CSS. All these files are placed in the **lib** folder in your project.</a:t>
+            </a:r>
+          </a:p>
+          <a:p>
+            <a:endParaRPr lang="en-US" dirty="0"/>
+          </a:p>
+          <a:p>
+            <a:r>
+              <a:rPr lang="en-US" dirty="0"/>
+              <a:t>The build process is initiated when you run the gulp task **build** from the command line:</a:t>
+            </a:r>
+          </a:p>
+          <a:p>
+            <a:endParaRPr lang="en-US" dirty="0"/>
+          </a:p>
+          <a:p>
+            <a:r>
+              <a:rPr lang="en-US" dirty="0"/>
+              <a:t>```shell</a:t>
+            </a:r>
+          </a:p>
+          <a:p>
+            <a:r>
+              <a:rPr lang="en-US" dirty="0"/>
+              <a:t>gulp build</a:t>
+            </a:r>
+          </a:p>
+          <a:p>
+            <a:r>
+              <a:rPr lang="en-US" dirty="0"/>
+              <a:t>```</a:t>
+            </a:r>
+          </a:p>
+          <a:p>
+            <a:endParaRPr lang="en-US" dirty="0"/>
+          </a:p>
+          <a:p>
+            <a:r>
+              <a:rPr lang="en-US" dirty="0"/>
+              <a:t>### Bundle</a:t>
+            </a:r>
+          </a:p>
+          <a:p>
+            <a:endParaRPr lang="en-US" dirty="0"/>
+          </a:p>
+          <a:p>
+            <a:r>
+              <a:rPr lang="en-US" dirty="0"/>
+              <a:t>The next phase is bundling. The bundling phase generates a JavaScript bundle and the manifest for the SharePoint Framework component.</a:t>
+            </a:r>
+          </a:p>
+          <a:p>
+            <a:endParaRPr lang="en-US" dirty="0"/>
+          </a:p>
+          <a:p>
+            <a:r>
+              <a:rPr lang="en-US" dirty="0"/>
+              <a:t>Bundling takes all the JavaScript and CSS files referenced in your project and combines them into a single JavaScript bundle. A configuration file enables developers to specify if multiple bundles generated with specific components in them, or if all components in the project are grouped into a single bundle.</a:t>
+            </a:r>
+          </a:p>
+          <a:p>
+            <a:endParaRPr lang="en-US" dirty="0"/>
+          </a:p>
+          <a:p>
+            <a:r>
+              <a:rPr lang="en-US" dirty="0"/>
+              <a:t>The popular open source tool Webpack is used to create the JavaScript bundle file. Normally developers need to create a configuration file and pass it into webpack when bundling, but the SharePoint Framework does this for you. When the bundling task is executed, the SharePoint Framework build toolchain dynamically creates the webpack configuration using configuration files in the project.</a:t>
+            </a:r>
+          </a:p>
+          <a:p>
+            <a:endParaRPr lang="en-US" dirty="0"/>
+          </a:p>
+          <a:p>
+            <a:r>
+              <a:rPr lang="en-US" dirty="0"/>
+              <a:t>The files generated in the bundling phase are saved to the **</a:t>
+            </a:r>
+            <a:r>
+              <a:rPr lang="en-US" dirty="0" err="1"/>
+              <a:t>dist</a:t>
+            </a:r>
+            <a:r>
+              <a:rPr lang="en-US" dirty="0"/>
+              <a:t>** folder in the project.</a:t>
+            </a:r>
+          </a:p>
+          <a:p>
+            <a:endParaRPr lang="en-US" dirty="0"/>
+          </a:p>
+          <a:p>
+            <a:r>
+              <a:rPr lang="en-US" dirty="0"/>
+              <a:t>The bundling process is initiated when you run the gulp task **bundle** from the command line. When you add the optional `--ship` or `-p` to the command, the bundling process will also minify the resulting bundle and manifest file. Minification removes all code comments and white space in the file to create the smallest possible file that's downloaded when the component is loaded on the page.</a:t>
+            </a:r>
+          </a:p>
+          <a:p>
+            <a:endParaRPr lang="en-US" dirty="0"/>
+          </a:p>
+          <a:p>
+            <a:r>
+              <a:rPr lang="en-US" dirty="0"/>
+              <a:t>```shell</a:t>
+            </a:r>
+          </a:p>
+          <a:p>
+            <a:r>
+              <a:rPr lang="en-US" dirty="0"/>
+              <a:t>gulp bundle</a:t>
+            </a:r>
+          </a:p>
+          <a:p>
+            <a:r>
+              <a:rPr lang="en-US" dirty="0"/>
+              <a:t>```</a:t>
+            </a:r>
+          </a:p>
+          <a:p>
+            <a:endParaRPr lang="en-US" dirty="0"/>
+          </a:p>
+          <a:p>
+            <a:r>
+              <a:rPr lang="en-US" dirty="0"/>
+              <a:t>### Package solution</a:t>
+            </a:r>
+          </a:p>
+          <a:p>
+            <a:endParaRPr lang="en-US" dirty="0"/>
+          </a:p>
+          <a:p>
+            <a:r>
+              <a:rPr lang="en-US" dirty="0"/>
+              <a:t>The last phase is packaging. The packaging phase generates all the files necessary to deploy your SharePoint Framework solution to SharePoint. These files are combined in to a ZIP archive with the file name **\*.</a:t>
+            </a:r>
+            <a:r>
+              <a:rPr lang="en-US" dirty="0" err="1"/>
+              <a:t>sppkg</a:t>
+            </a:r>
+            <a:r>
+              <a:rPr lang="en-US" dirty="0"/>
+              <a:t>** that's saved to the **</a:t>
+            </a:r>
+            <a:r>
+              <a:rPr lang="en-US" dirty="0" err="1"/>
+              <a:t>sharepoint</a:t>
+            </a:r>
+            <a:r>
+              <a:rPr lang="en-US" dirty="0"/>
+              <a:t>** folder in your project. This file is referred to as the *SharePoint package*.</a:t>
+            </a:r>
+          </a:p>
+          <a:p>
+            <a:endParaRPr lang="en-US" dirty="0"/>
+          </a:p>
+          <a:p>
+            <a:r>
+              <a:rPr lang="en-US" dirty="0"/>
+              <a:t>Prior to packaging all the files into the SharePoint package, the package solution phase generates multiple files necessary for deployment. This includes creating the app manifest, any feature definitions and element manifests necessary for provisioning the components, and collecting all the runtime files such as the bundle, component manifest and string localization files.</a:t>
+            </a:r>
+          </a:p>
+          <a:p>
+            <a:endParaRPr lang="en-US" dirty="0"/>
+          </a:p>
+          <a:p>
+            <a:r>
+              <a:rPr lang="en-US" dirty="0"/>
+              <a:t>Depending on the project configuration, the component runtime files including the bundle, component manifest, localization files, are placed in the **./temp/deploy** folder or added to the package. You can configure this setting using **./config/package-</a:t>
+            </a:r>
+            <a:r>
+              <a:rPr lang="en-US" dirty="0" err="1"/>
+              <a:t>solution.json</a:t>
+            </a:r>
+            <a:r>
+              <a:rPr lang="en-US" dirty="0"/>
+              <a:t>** file using the `</a:t>
+            </a:r>
+            <a:r>
+              <a:rPr lang="en-US" dirty="0" err="1"/>
+              <a:t>includeClientSideAssets</a:t>
+            </a:r>
+            <a:r>
+              <a:rPr lang="en-US" dirty="0"/>
+              <a:t>` property. When set to `true`, the files are added to the package and are automatically provisioned to the SharePoint library **</a:t>
+            </a:r>
+            <a:r>
+              <a:rPr lang="en-US" dirty="0" err="1"/>
+              <a:t>ClientSideAssets</a:t>
+            </a:r>
+            <a:r>
+              <a:rPr lang="en-US" dirty="0"/>
+              <a:t>** in the root of the site collection where the app is installed. Otherwise, when the property is set to `false`, you are responsible for deploying the files to a location your users can access, such as an Azure CDN.</a:t>
+            </a:r>
+          </a:p>
+          <a:p>
+            <a:endParaRPr lang="en-US" dirty="0"/>
+          </a:p>
+          <a:p>
+            <a:r>
+              <a:rPr lang="en-US" dirty="0"/>
+              <a:t>The packaging process is initiated when you run the gulp task **package-solution** from the command line. When you add the optional `--ship` or `-p` to the command, the packaging process will also modify manifest files for production, setting the URL where the component's runtime files can be located. This location is defined in the **./config/write-</a:t>
+            </a:r>
+            <a:r>
+              <a:rPr lang="en-US" dirty="0" err="1"/>
+              <a:t>manifests.json</a:t>
+            </a:r>
+            <a:r>
+              <a:rPr lang="en-US" dirty="0"/>
+              <a:t>** file.</a:t>
+            </a:r>
+          </a:p>
+          <a:p>
+            <a:endParaRPr lang="en-US" dirty="0"/>
+          </a:p>
+          <a:p>
+            <a:r>
+              <a:rPr lang="en-US" dirty="0"/>
+              <a:t>```shell</a:t>
+            </a:r>
+          </a:p>
+          <a:p>
+            <a:r>
+              <a:rPr lang="en-US" dirty="0"/>
+              <a:t>gulp package-solution</a:t>
+            </a:r>
+          </a:p>
+          <a:p>
+            <a:r>
+              <a:rPr lang="en-US" dirty="0"/>
+              <a:t>```</a:t>
+            </a:r>
           </a:p>
         </p:txBody>
       </p:sp>
@@ -10948,7 +11641,7 @@
             <a:spLocks noGrp="1"/>
           </p:cNvSpPr>
           <p:nvPr>
-            <p:ph type="hdr" sz="quarter" idx="10"/>
+            <p:ph type="hdr" sz="quarter"/>
           </p:nvPr>
         </p:nvSpPr>
         <p:spPr/>
@@ -10956,6 +11649,10 @@
           <a:bodyPr/>
           <a:lstStyle/>
           <a:p>
+            <a:r>
+              <a:rPr lang="en-US"/>
+              <a:t>SharePoint Framework</a:t>
+            </a:r>
             <a:endParaRPr lang="en-US" dirty="0"/>
           </a:p>
         </p:txBody>
@@ -10967,7 +11664,7 @@
             <a:spLocks noGrp="1"/>
           </p:cNvSpPr>
           <p:nvPr>
-            <p:ph type="ftr" sz="quarter" idx="11"/>
+            <p:ph type="ftr" sz="quarter" idx="4"/>
           </p:nvPr>
         </p:nvSpPr>
         <p:spPr/>
@@ -11021,7 +11718,7 @@
             <a:spLocks noGrp="1"/>
           </p:cNvSpPr>
           <p:nvPr>
-            <p:ph type="dt" idx="12"/>
+            <p:ph type="dt" idx="1"/>
           </p:nvPr>
         </p:nvSpPr>
         <p:spPr/>
@@ -11031,7 +11728,7 @@
           <a:p>
             <a:fld id="{D18B56EA-E28F-4F92-9F16-7A6F2501B303}" type="datetime8">
               <a:rPr lang="en-US" smtClean="0"/>
-              <a:t>3/14/19 2:48 PM</a:t>
+              <a:t>3/7/20 4:56 AM</a:t>
             </a:fld>
             <a:endParaRPr lang="en-US" dirty="0"/>
           </a:p>
@@ -11044,7 +11741,7 @@
             <a:spLocks noGrp="1"/>
           </p:cNvSpPr>
           <p:nvPr>
-            <p:ph type="sldNum" sz="quarter" idx="13"/>
+            <p:ph type="sldNum" sz="quarter" idx="5"/>
           </p:nvPr>
         </p:nvSpPr>
         <p:spPr/>
@@ -11055,7 +11752,7 @@
             <a:fld id="{B4008EB6-D09E-4580-8CD6-DDB14511944F}" type="slidenum">
               <a:rPr lang="en-US" smtClean="0"/>
               <a:pPr/>
-              <a:t>8</a:t>
+              <a:t>4</a:t>
             </a:fld>
             <a:endParaRPr lang="en-US" dirty="0"/>
           </a:p>
@@ -11064,7 +11761,7 @@
     </p:spTree>
     <p:extLst>
       <p:ext uri="{BB962C8B-B14F-4D97-AF65-F5344CB8AC3E}">
-        <p14:creationId xmlns:p14="http://schemas.microsoft.com/office/powerpoint/2010/main" val="3738293785"/>
+        <p14:creationId xmlns:p14="http://schemas.microsoft.com/office/powerpoint/2010/main" val="4009473812"/>
       </p:ext>
     </p:extLst>
   </p:cSld>
@@ -11118,6 +11815,116 @@
           <a:bodyPr/>
           <a:lstStyle/>
           <a:p>
+            <a:r>
+              <a:rPr lang="en-US" dirty="0"/>
+              <a:t>In the previous section, you learned that two of the gulp tasks used in creating a SharePoint package support an optional `--ship` switch. This switch indicates you are bundling and packaging for production. When the switch isn't present, it indicates you are bundling and packaging for development or debugging.</a:t>
+            </a:r>
+          </a:p>
+          <a:p>
+            <a:endParaRPr lang="en-US" dirty="0"/>
+          </a:p>
+          <a:p>
+            <a:r>
+              <a:rPr lang="en-US" dirty="0"/>
+              <a:t>The gulp **build** task doesn't have any switches, but both the **bundle** and **package-solution** tasks support the optional `--ship` switch. When running **bundle** and **package-solution**, make sure both either use or don't use the `--ship` switch. In other worse, don't use it on one and not the other.</a:t>
+            </a:r>
+          </a:p>
+          <a:p>
+            <a:endParaRPr lang="en-US" dirty="0"/>
+          </a:p>
+          <a:p>
+            <a:r>
+              <a:rPr lang="en-US" dirty="0"/>
+              <a:t>### Debug mode</a:t>
+            </a:r>
+          </a:p>
+          <a:p>
+            <a:endParaRPr lang="en-US" dirty="0"/>
+          </a:p>
+          <a:p>
+            <a:r>
+              <a:rPr lang="en-US" dirty="0"/>
+              <a:t>When bundling and packaging the solution in debug mode, all generated files are left un-minified. This means the code comments and white space is left in the generated bundle and component manifest files.</a:t>
+            </a:r>
+          </a:p>
+          <a:p>
+            <a:endParaRPr lang="en-US" dirty="0"/>
+          </a:p>
+          <a:p>
+            <a:r>
+              <a:rPr lang="en-US" dirty="0"/>
+              <a:t>The bundling process also generates JavaScript source map files that can be used when debugging the component at runtime. Source map files map the generated JavaScript to the source TypeScript code so when a breakpoint is hit in JavaScript, you'll be able to easily debug the TypeScript and not have to figure out what TypeScript code mapped to the generated JavaScript code.</a:t>
+            </a:r>
+          </a:p>
+          <a:p>
+            <a:endParaRPr lang="en-US" dirty="0"/>
+          </a:p>
+          <a:p>
+            <a:r>
+              <a:rPr lang="en-US" dirty="0"/>
+              <a:t>The debug mode assumes that all files are served from the local web server. Even if you deploy and install the SharePoint package in a SharePoint environment, SharePoint will look for the component's bundle and manifest file on the local web server.</a:t>
+            </a:r>
+          </a:p>
+          <a:p>
+            <a:endParaRPr lang="en-US" dirty="0"/>
+          </a:p>
+          <a:p>
+            <a:r>
+              <a:rPr lang="en-US" dirty="0"/>
+              <a:t>## Production mode</a:t>
+            </a:r>
+          </a:p>
+          <a:p>
+            <a:endParaRPr lang="en-US" dirty="0"/>
+          </a:p>
+          <a:p>
+            <a:r>
+              <a:rPr lang="en-US" dirty="0"/>
+              <a:t>When bundling and packaging the solution in production mode, all generated files are minified. This means the code comments and white space is removed in the generated bundle and component manifest files to create the smallest files that will be downloaded at runtime in the browser.</a:t>
+            </a:r>
+          </a:p>
+          <a:p>
+            <a:endParaRPr lang="en-US" dirty="0"/>
+          </a:p>
+          <a:p>
+            <a:r>
+              <a:rPr lang="en-US" dirty="0"/>
+              <a:t>Unlike the debug mode, the production mode does not generate source map files.</a:t>
+            </a:r>
+          </a:p>
+          <a:p>
+            <a:endParaRPr lang="en-US" dirty="0"/>
+          </a:p>
+          <a:p>
+            <a:r>
+              <a:rPr lang="en-US" dirty="0"/>
+              <a:t>&gt; [!TIP]</a:t>
+            </a:r>
+          </a:p>
+          <a:p>
+            <a:r>
+              <a:rPr lang="en-US" dirty="0"/>
+              <a:t>&gt; Developers can configure the webpack configuration using the SharePoint Framework build toolchain API to generate source map files when bundling in production mode.</a:t>
+            </a:r>
+          </a:p>
+          <a:p>
+            <a:endParaRPr lang="en-US" dirty="0"/>
+          </a:p>
+          <a:p>
+            <a:r>
+              <a:rPr lang="en-US" dirty="0"/>
+              <a:t>The production mode assumes that all files are served from their production locations. This is defined in the **./config/write-</a:t>
+            </a:r>
+            <a:r>
+              <a:rPr lang="en-US" dirty="0" err="1"/>
+              <a:t>manifests.json</a:t>
+            </a:r>
+            <a:r>
+              <a:rPr lang="en-US" dirty="0"/>
+              <a:t>** configuration file.</a:t>
+            </a:r>
+          </a:p>
+          <a:p>
             <a:endParaRPr lang="en-US" dirty="0"/>
           </a:p>
         </p:txBody>
@@ -11129,7 +11936,7 @@
             <a:spLocks noGrp="1"/>
           </p:cNvSpPr>
           <p:nvPr>
-            <p:ph type="hdr" sz="quarter" idx="10"/>
+            <p:ph type="hdr" sz="quarter"/>
           </p:nvPr>
         </p:nvSpPr>
         <p:spPr/>
@@ -11137,6 +11944,10 @@
           <a:bodyPr/>
           <a:lstStyle/>
           <a:p>
+            <a:r>
+              <a:rPr lang="en-US"/>
+              <a:t>SharePoint Framework</a:t>
+            </a:r>
             <a:endParaRPr lang="en-US" dirty="0"/>
           </a:p>
         </p:txBody>
@@ -11148,7 +11959,7 @@
             <a:spLocks noGrp="1"/>
           </p:cNvSpPr>
           <p:nvPr>
-            <p:ph type="ftr" sz="quarter" idx="11"/>
+            <p:ph type="ftr" sz="quarter" idx="4"/>
           </p:nvPr>
         </p:nvSpPr>
         <p:spPr/>
@@ -11202,7 +12013,7 @@
             <a:spLocks noGrp="1"/>
           </p:cNvSpPr>
           <p:nvPr>
-            <p:ph type="dt" idx="12"/>
+            <p:ph type="dt" idx="1"/>
           </p:nvPr>
         </p:nvSpPr>
         <p:spPr/>
@@ -11212,7 +12023,7 @@
           <a:p>
             <a:fld id="{D18B56EA-E28F-4F92-9F16-7A6F2501B303}" type="datetime8">
               <a:rPr lang="en-US" smtClean="0"/>
-              <a:t>3/14/19 1:59 PM</a:t>
+              <a:t>3/7/20 5:07 AM</a:t>
             </a:fld>
             <a:endParaRPr lang="en-US" dirty="0"/>
           </a:p>
@@ -11225,7 +12036,7 @@
             <a:spLocks noGrp="1"/>
           </p:cNvSpPr>
           <p:nvPr>
-            <p:ph type="sldNum" sz="quarter" idx="13"/>
+            <p:ph type="sldNum" sz="quarter" idx="5"/>
           </p:nvPr>
         </p:nvSpPr>
         <p:spPr/>
@@ -11236,7 +12047,7 @@
             <a:fld id="{B4008EB6-D09E-4580-8CD6-DDB14511944F}" type="slidenum">
               <a:rPr lang="en-US" smtClean="0"/>
               <a:pPr/>
-              <a:t>10</a:t>
+              <a:t>5</a:t>
             </a:fld>
             <a:endParaRPr lang="en-US" dirty="0"/>
           </a:p>
@@ -11245,7 +12056,7 @@
     </p:spTree>
     <p:extLst>
       <p:ext uri="{BB962C8B-B14F-4D97-AF65-F5344CB8AC3E}">
-        <p14:creationId xmlns:p14="http://schemas.microsoft.com/office/powerpoint/2010/main" val="3282806226"/>
+        <p14:creationId xmlns:p14="http://schemas.microsoft.com/office/powerpoint/2010/main" val="293988904"/>
       </p:ext>
     </p:extLst>
   </p:cSld>
@@ -11299,7 +12110,116 @@
           <a:bodyPr/>
           <a:lstStyle/>
           <a:p>
-            <a:endParaRPr lang="en-US"/>
+            <a:r>
+              <a:rPr lang="en-US" dirty="0"/>
+              <a:t>After creating the SharePoint package, the next step is to deploy it to a SharePoint environment. There are two ways to deploy SharePoint packages. Both options are SharePoint App Catalogs.</a:t>
+            </a:r>
+          </a:p>
+          <a:p>
+            <a:endParaRPr lang="en-US" dirty="0"/>
+          </a:p>
+          <a:p>
+            <a:r>
+              <a:rPr lang="en-US" dirty="0"/>
+              <a:t>SharePoint Online supports two types of App Catalogs: tenant-scoped and site collection-scoped.</a:t>
+            </a:r>
+          </a:p>
+          <a:p>
+            <a:endParaRPr lang="en-US" dirty="0"/>
+          </a:p>
+          <a:p>
+            <a:r>
+              <a:rPr lang="en-US" dirty="0"/>
+              <a:t>The other part of package deployment addresses the runtime files required for your component to function. This includes your component's JavaScript bundle and manifest files as well as any external dependencies. These files must be deployed to a hosting location that all the users on a site can access.</a:t>
+            </a:r>
+          </a:p>
+          <a:p>
+            <a:endParaRPr lang="en-US" dirty="0"/>
+          </a:p>
+          <a:p>
+            <a:r>
+              <a:rPr lang="en-US" dirty="0"/>
+              <a:t>### Deploying component runtime files</a:t>
+            </a:r>
+          </a:p>
+          <a:p>
+            <a:endParaRPr lang="en-US" dirty="0"/>
+          </a:p>
+          <a:p>
+            <a:r>
+              <a:rPr lang="en-US" dirty="0"/>
+              <a:t>The decision on where to host these runtime files falls into two categories. The first category are manual options. With this option, you manually copy or upload files to the target location. Some examples of the manual deployment option include the Office 365 CDN, an Azure CDN, or any location that is on a public or internal URL. The only requirement is that the files must be accessible to the users of your site.</a:t>
+            </a:r>
+          </a:p>
+          <a:p>
+            <a:endParaRPr lang="en-US" dirty="0"/>
+          </a:p>
+          <a:p>
+            <a:r>
+              <a:rPr lang="en-US" dirty="0"/>
+              <a:t>The other option to deploy the runtime files is more automatic. In late 2017, Microsoft introduced a setting `</a:t>
+            </a:r>
+            <a:r>
+              <a:rPr lang="en-US" dirty="0" err="1"/>
+              <a:t>includeClientAssets</a:t>
+            </a:r>
+            <a:r>
+              <a:rPr lang="en-US" dirty="0"/>
+              <a:t>` to the **./</a:t>
+            </a:r>
+            <a:r>
+              <a:rPr lang="en-US" dirty="0" err="1"/>
+              <a:t>src</a:t>
+            </a:r>
+            <a:r>
+              <a:rPr lang="en-US" dirty="0"/>
+              <a:t>/config/package-</a:t>
+            </a:r>
+            <a:r>
+              <a:rPr lang="en-US" dirty="0" err="1"/>
+              <a:t>solution.json</a:t>
+            </a:r>
+            <a:r>
+              <a:rPr lang="en-US" dirty="0"/>
+              <a:t>** file. When this property is set to true, the runtime files are included in the SharePoint package.</a:t>
+            </a:r>
+          </a:p>
+          <a:p>
+            <a:endParaRPr lang="en-US" dirty="0"/>
+          </a:p>
+          <a:p>
+            <a:r>
+              <a:rPr lang="en-US" dirty="0"/>
+              <a:t>When you install an app from the SharePoint package in a site collection, SharePoint will copy the runtime files to a hidden library, **</a:t>
+            </a:r>
+            <a:r>
+              <a:rPr lang="en-US" dirty="0" err="1"/>
+              <a:t>ClientSideAssets</a:t>
+            </a:r>
+            <a:r>
+              <a:rPr lang="en-US" dirty="0"/>
+              <a:t>**, in the root of the site collection. Your component's manifest file contains a special URL that is replaced at runtime by the SharePoint Framework to point to the site collection's **</a:t>
+            </a:r>
+            <a:r>
+              <a:rPr lang="en-US" dirty="0" err="1"/>
+              <a:t>ClientSideAssets</a:t>
+            </a:r>
+            <a:r>
+              <a:rPr lang="en-US" dirty="0"/>
+              <a:t>** library.</a:t>
+            </a:r>
+          </a:p>
+          <a:p>
+            <a:endParaRPr lang="en-US" dirty="0"/>
+          </a:p>
+          <a:p>
+            <a:r>
+              <a:rPr lang="en-US" dirty="0"/>
+              <a:t>If you've enabled the Office 365 CDN, this library is included in the list of libraries that are backed by the CDN. </a:t>
+            </a:r>
+          </a:p>
+          <a:p>
+            <a:endParaRPr lang="en-US" dirty="0"/>
           </a:p>
         </p:txBody>
       </p:sp>
@@ -11310,7 +12230,7 @@
             <a:spLocks noGrp="1"/>
           </p:cNvSpPr>
           <p:nvPr>
-            <p:ph type="hdr" sz="quarter" idx="10"/>
+            <p:ph type="hdr" sz="quarter"/>
           </p:nvPr>
         </p:nvSpPr>
         <p:spPr/>
@@ -11318,6 +12238,10 @@
           <a:bodyPr/>
           <a:lstStyle/>
           <a:p>
+            <a:r>
+              <a:rPr lang="en-US"/>
+              <a:t>SharePoint Framework</a:t>
+            </a:r>
             <a:endParaRPr lang="en-US" dirty="0"/>
           </a:p>
         </p:txBody>
@@ -11329,7 +12253,7 @@
             <a:spLocks noGrp="1"/>
           </p:cNvSpPr>
           <p:nvPr>
-            <p:ph type="ftr" sz="quarter" idx="11"/>
+            <p:ph type="ftr" sz="quarter" idx="4"/>
           </p:nvPr>
         </p:nvSpPr>
         <p:spPr/>
@@ -11383,7 +12307,7 @@
             <a:spLocks noGrp="1"/>
           </p:cNvSpPr>
           <p:nvPr>
-            <p:ph type="dt" idx="12"/>
+            <p:ph type="dt" idx="1"/>
           </p:nvPr>
         </p:nvSpPr>
         <p:spPr/>
@@ -11393,7 +12317,7 @@
           <a:p>
             <a:fld id="{D18B56EA-E28F-4F92-9F16-7A6F2501B303}" type="datetime8">
               <a:rPr lang="en-US" smtClean="0"/>
-              <a:t>3/14/19 1:45 PM</a:t>
+              <a:t>3/8/20 6:58 AM</a:t>
             </a:fld>
             <a:endParaRPr lang="en-US" dirty="0"/>
           </a:p>
@@ -11406,7 +12330,7 @@
             <a:spLocks noGrp="1"/>
           </p:cNvSpPr>
           <p:nvPr>
-            <p:ph type="sldNum" sz="quarter" idx="13"/>
+            <p:ph type="sldNum" sz="quarter" idx="5"/>
           </p:nvPr>
         </p:nvSpPr>
         <p:spPr/>
@@ -11417,7 +12341,7 @@
             <a:fld id="{B4008EB6-D09E-4580-8CD6-DDB14511944F}" type="slidenum">
               <a:rPr lang="en-US" smtClean="0"/>
               <a:pPr/>
-              <a:t>11</a:t>
+              <a:t>6</a:t>
             </a:fld>
             <a:endParaRPr lang="en-US" dirty="0"/>
           </a:p>
@@ -11426,7 +12350,7 @@
     </p:spTree>
     <p:extLst>
       <p:ext uri="{BB962C8B-B14F-4D97-AF65-F5344CB8AC3E}">
-        <p14:creationId xmlns:p14="http://schemas.microsoft.com/office/powerpoint/2010/main" val="2510823477"/>
+        <p14:creationId xmlns:p14="http://schemas.microsoft.com/office/powerpoint/2010/main" val="3275783804"/>
       </p:ext>
     </p:extLst>
   </p:cSld>
@@ -11480,7 +12404,74 @@
           <a:bodyPr/>
           <a:lstStyle/>
           <a:p>
-            <a:endParaRPr lang="en-US"/>
+            <a:r>
+              <a:rPr lang="en-US" dirty="0"/>
+              <a:t>Let's review the deployment and installation steps for a SharePoint Framework solution.</a:t>
+            </a:r>
+          </a:p>
+          <a:p>
+            <a:endParaRPr lang="en-US" dirty="0"/>
+          </a:p>
+          <a:p>
+            <a:pPr marL="171450" indent="-171450">
+              <a:buFont typeface="Arial" panose="020B0604020202020204" pitchFamily="34" charset="0"/>
+              <a:buChar char="•"/>
+            </a:pPr>
+            <a:r>
+              <a:rPr lang="en-US" dirty="0"/>
+              <a:t>Build the project: The first step is to build your project with the **gulp build** command. This will create all the files that are used in the deployment of your solution. </a:t>
+            </a:r>
+          </a:p>
+          <a:p>
+            <a:pPr marL="171450" indent="-171450">
+              <a:buFont typeface="Arial" panose="020B0604020202020204" pitchFamily="34" charset="0"/>
+              <a:buChar char="•"/>
+            </a:pPr>
+            <a:r>
+              <a:rPr lang="en-US" dirty="0"/>
+              <a:t>Generate the bundle and manifest: Next, create the component bundle and manifest files for production using the **gulp bundle --ship** command. This step takes the files from the build step and creates the files that will be deployed to SharePoint.</a:t>
+            </a:r>
+          </a:p>
+          <a:p>
+            <a:pPr marL="171450" indent="-171450">
+              <a:buFont typeface="Arial" panose="020B0604020202020204" pitchFamily="34" charset="0"/>
+              <a:buChar char="•"/>
+            </a:pPr>
+            <a:r>
+              <a:rPr lang="en-US" dirty="0"/>
+              <a:t>Generate the SharePoint package: The final step in the packaging process is to create the SharePoint package with the **gulp package-solution --ship** command. This step takes the results from the bundle phase, generates the necessary deployment files including an app manifest and associated feature files, and packages them into a single archive named **\*.</a:t>
+            </a:r>
+            <a:r>
+              <a:rPr lang="en-US" dirty="0" err="1"/>
+              <a:t>sppkg</a:t>
+            </a:r>
+            <a:r>
+              <a:rPr lang="en-US" dirty="0"/>
+              <a:t>**.</a:t>
+            </a:r>
+          </a:p>
+          <a:p>
+            <a:pPr marL="171450" indent="-171450">
+              <a:buFont typeface="Arial" panose="020B0604020202020204" pitchFamily="34" charset="0"/>
+              <a:buChar char="•"/>
+            </a:pPr>
+            <a:r>
+              <a:rPr lang="en-US" dirty="0"/>
+              <a:t>Upload the package to the App Catalog: Now that you've created the package, the next step is to upload the package to one of the SharePoint App Catalogs. Part of this process is to also trust the package, indicating to SharePoint the app within the SharePoint package are safe to run in your environment. This step makes the components available for installation and use within your SharePoint environment.</a:t>
+            </a:r>
+          </a:p>
+          <a:p>
+            <a:pPr marL="171450" indent="-171450">
+              <a:buFont typeface="Arial" panose="020B0604020202020204" pitchFamily="34" charset="0"/>
+              <a:buChar char="•"/>
+            </a:pPr>
+            <a:r>
+              <a:rPr lang="en-US" dirty="0"/>
+              <a:t>Install the app from the site collection's Site Contents page: The last step is to install the app from the package into a site collection. This is done from the **New &gt; App** menu in the **Site Contents** library in a site collection.</a:t>
+            </a:r>
+          </a:p>
+          <a:p>
+            <a:endParaRPr lang="en-US" dirty="0"/>
           </a:p>
         </p:txBody>
       </p:sp>
@@ -11491,7 +12482,7 @@
             <a:spLocks noGrp="1"/>
           </p:cNvSpPr>
           <p:nvPr>
-            <p:ph type="hdr" sz="quarter" idx="10"/>
+            <p:ph type="hdr" sz="quarter"/>
           </p:nvPr>
         </p:nvSpPr>
         <p:spPr/>
@@ -11499,6 +12490,10 @@
           <a:bodyPr/>
           <a:lstStyle/>
           <a:p>
+            <a:r>
+              <a:rPr lang="en-US"/>
+              <a:t>SharePoint Framework</a:t>
+            </a:r>
             <a:endParaRPr lang="en-US" dirty="0"/>
           </a:p>
         </p:txBody>
@@ -11510,7 +12505,7 @@
             <a:spLocks noGrp="1"/>
           </p:cNvSpPr>
           <p:nvPr>
-            <p:ph type="ftr" sz="quarter" idx="11"/>
+            <p:ph type="ftr" sz="quarter" idx="4"/>
           </p:nvPr>
         </p:nvSpPr>
         <p:spPr/>
@@ -11564,6 +12559,187 @@
             <a:spLocks noGrp="1"/>
           </p:cNvSpPr>
           <p:nvPr>
+            <p:ph type="dt" idx="1"/>
+          </p:nvPr>
+        </p:nvSpPr>
+        <p:spPr/>
+        <p:txBody>
+          <a:bodyPr/>
+          <a:lstStyle/>
+          <a:p>
+            <a:fld id="{D18B56EA-E28F-4F92-9F16-7A6F2501B303}" type="datetime8">
+              <a:rPr lang="en-US" smtClean="0"/>
+              <a:t>3/8/20 7:11 AM</a:t>
+            </a:fld>
+            <a:endParaRPr lang="en-US" dirty="0"/>
+          </a:p>
+        </p:txBody>
+      </p:sp>
+      <p:sp>
+        <p:nvSpPr>
+          <p:cNvPr id="7" name="Slide Number Placeholder 6"/>
+          <p:cNvSpPr>
+            <a:spLocks noGrp="1"/>
+          </p:cNvSpPr>
+          <p:nvPr>
+            <p:ph type="sldNum" sz="quarter" idx="5"/>
+          </p:nvPr>
+        </p:nvSpPr>
+        <p:spPr/>
+        <p:txBody>
+          <a:bodyPr/>
+          <a:lstStyle/>
+          <a:p>
+            <a:fld id="{B4008EB6-D09E-4580-8CD6-DDB14511944F}" type="slidenum">
+              <a:rPr lang="en-US" smtClean="0"/>
+              <a:pPr/>
+              <a:t>7</a:t>
+            </a:fld>
+            <a:endParaRPr lang="en-US" dirty="0"/>
+          </a:p>
+        </p:txBody>
+      </p:sp>
+    </p:spTree>
+    <p:extLst>
+      <p:ext uri="{BB962C8B-B14F-4D97-AF65-F5344CB8AC3E}">
+        <p14:creationId xmlns:p14="http://schemas.microsoft.com/office/powerpoint/2010/main" val="3142137961"/>
+      </p:ext>
+    </p:extLst>
+  </p:cSld>
+  <p:clrMapOvr>
+    <a:masterClrMapping/>
+  </p:clrMapOvr>
+</p:notes>
+</file>
+
+<file path=ppt/notesSlides/notesSlide8.xml><?xml version="1.0" encoding="utf-8"?>
+<p:notes xmlns:a="http://schemas.openxmlformats.org/drawingml/2006/main" xmlns:r="http://schemas.openxmlformats.org/officeDocument/2006/relationships" xmlns:p="http://schemas.openxmlformats.org/presentationml/2006/main">
+  <p:cSld>
+    <p:spTree>
+      <p:nvGrpSpPr>
+        <p:cNvPr id="1" name=""/>
+        <p:cNvGrpSpPr/>
+        <p:nvPr/>
+      </p:nvGrpSpPr>
+      <p:grpSpPr>
+        <a:xfrm>
+          <a:off x="0" y="0"/>
+          <a:ext cx="0" cy="0"/>
+          <a:chOff x="0" y="0"/>
+          <a:chExt cx="0" cy="0"/>
+        </a:xfrm>
+      </p:grpSpPr>
+      <p:sp>
+        <p:nvSpPr>
+          <p:cNvPr id="2" name="Slide Image Placeholder 1"/>
+          <p:cNvSpPr>
+            <a:spLocks noGrp="1" noRot="1" noChangeAspect="1"/>
+          </p:cNvSpPr>
+          <p:nvPr>
+            <p:ph type="sldImg"/>
+          </p:nvPr>
+        </p:nvSpPr>
+        <p:spPr/>
+      </p:sp>
+      <p:sp>
+        <p:nvSpPr>
+          <p:cNvPr id="3" name="Notes Placeholder 2"/>
+          <p:cNvSpPr>
+            <a:spLocks noGrp="1"/>
+          </p:cNvSpPr>
+          <p:nvPr>
+            <p:ph type="body" idx="1"/>
+          </p:nvPr>
+        </p:nvSpPr>
+        <p:spPr/>
+        <p:txBody>
+          <a:bodyPr/>
+          <a:lstStyle/>
+          <a:p>
+            <a:endParaRPr lang="en-US"/>
+          </a:p>
+        </p:txBody>
+      </p:sp>
+      <p:sp>
+        <p:nvSpPr>
+          <p:cNvPr id="4" name="Header Placeholder 3"/>
+          <p:cNvSpPr>
+            <a:spLocks noGrp="1"/>
+          </p:cNvSpPr>
+          <p:nvPr>
+            <p:ph type="hdr" sz="quarter" idx="10"/>
+          </p:nvPr>
+        </p:nvSpPr>
+        <p:spPr/>
+        <p:txBody>
+          <a:bodyPr/>
+          <a:lstStyle/>
+          <a:p>
+            <a:endParaRPr lang="en-US" dirty="0"/>
+          </a:p>
+        </p:txBody>
+      </p:sp>
+      <p:sp>
+        <p:nvSpPr>
+          <p:cNvPr id="5" name="Footer Placeholder 4"/>
+          <p:cNvSpPr>
+            <a:spLocks noGrp="1"/>
+          </p:cNvSpPr>
+          <p:nvPr>
+            <p:ph type="ftr" sz="quarter" idx="11"/>
+          </p:nvPr>
+        </p:nvSpPr>
+        <p:spPr/>
+        <p:txBody>
+          <a:bodyPr/>
+          <a:lstStyle/>
+          <a:p>
+            <a:pPr defTabSz="914099" eaLnBrk="0" hangingPunct="0"/>
+            <a:r>
+              <a:rPr lang="en-US" sz="400">
+                <a:gradFill>
+                  <a:gsLst>
+                    <a:gs pos="0">
+                      <a:prstClr val="black"/>
+                    </a:gs>
+                    <a:gs pos="100000">
+                      <a:prstClr val="black"/>
+                    </a:gs>
+                  </a:gsLst>
+                  <a:lin ang="5400000" scaled="0"/>
+                </a:gradFill>
+                <a:latin typeface="Segoe UI" pitchFamily="34" charset="0"/>
+                <a:ea typeface="Segoe UI" pitchFamily="34" charset="0"/>
+                <a:cs typeface="Segoe UI" pitchFamily="34" charset="0"/>
+              </a:rPr>
+              <a:t>© Microsoft Corporation. All rights reserved. MICROSOFT MAKES NO WARRANTIES, EXPRESS, IMPLIED OR STATUTORY, AS TO THE INFORMATION IN THIS PRESENTATION.</a:t>
+            </a:r>
+            <a:endParaRPr lang="en-US" sz="400" dirty="0">
+              <a:gradFill>
+                <a:gsLst>
+                  <a:gs pos="0">
+                    <a:prstClr val="black"/>
+                  </a:gs>
+                  <a:gs pos="100000">
+                    <a:prstClr val="black"/>
+                  </a:gs>
+                </a:gsLst>
+                <a:lin ang="5400000" scaled="0"/>
+              </a:gradFill>
+              <a:latin typeface="Segoe UI" pitchFamily="34" charset="0"/>
+              <a:ea typeface="Segoe UI" pitchFamily="34" charset="0"/>
+              <a:cs typeface="Segoe UI" pitchFamily="34" charset="0"/>
+            </a:endParaRPr>
+          </a:p>
+        </p:txBody>
+      </p:sp>
+      <p:sp>
+        <p:nvSpPr>
+          <p:cNvPr id="6" name="Date Placeholder 5"/>
+          <p:cNvSpPr>
+            <a:spLocks noGrp="1"/>
+          </p:cNvSpPr>
+          <p:nvPr>
             <p:ph type="dt" idx="12"/>
           </p:nvPr>
         </p:nvSpPr>
@@ -11574,7 +12750,7 @@
           <a:p>
             <a:fld id="{D18B56EA-E28F-4F92-9F16-7A6F2501B303}" type="datetime8">
               <a:rPr lang="en-US" smtClean="0"/>
-              <a:t>3/14/19 1:45 PM</a:t>
+              <a:t>3/6/20 3:29 PM</a:t>
             </a:fld>
             <a:endParaRPr lang="en-US" dirty="0"/>
           </a:p>
@@ -11598,7 +12774,7 @@
             <a:fld id="{B4008EB6-D09E-4580-8CD6-DDB14511944F}" type="slidenum">
               <a:rPr lang="en-US" smtClean="0"/>
               <a:pPr/>
-              <a:t>12</a:t>
+              <a:t>8</a:t>
             </a:fld>
             <a:endParaRPr lang="en-US" dirty="0"/>
           </a:p>
@@ -11607,7 +12783,188 @@
     </p:spTree>
     <p:extLst>
       <p:ext uri="{BB962C8B-B14F-4D97-AF65-F5344CB8AC3E}">
-        <p14:creationId xmlns:p14="http://schemas.microsoft.com/office/powerpoint/2010/main" val="1685519606"/>
+        <p14:creationId xmlns:p14="http://schemas.microsoft.com/office/powerpoint/2010/main" val="3738293785"/>
+      </p:ext>
+    </p:extLst>
+  </p:cSld>
+  <p:clrMapOvr>
+    <a:masterClrMapping/>
+  </p:clrMapOvr>
+</p:notes>
+</file>
+
+<file path=ppt/notesSlides/notesSlide9.xml><?xml version="1.0" encoding="utf-8"?>
+<p:notes xmlns:a="http://schemas.openxmlformats.org/drawingml/2006/main" xmlns:r="http://schemas.openxmlformats.org/officeDocument/2006/relationships" xmlns:p="http://schemas.openxmlformats.org/presentationml/2006/main">
+  <p:cSld>
+    <p:spTree>
+      <p:nvGrpSpPr>
+        <p:cNvPr id="1" name=""/>
+        <p:cNvGrpSpPr/>
+        <p:nvPr/>
+      </p:nvGrpSpPr>
+      <p:grpSpPr>
+        <a:xfrm>
+          <a:off x="0" y="0"/>
+          <a:ext cx="0" cy="0"/>
+          <a:chOff x="0" y="0"/>
+          <a:chExt cx="0" cy="0"/>
+        </a:xfrm>
+      </p:grpSpPr>
+      <p:sp>
+        <p:nvSpPr>
+          <p:cNvPr id="2" name="Slide Image Placeholder 1"/>
+          <p:cNvSpPr>
+            <a:spLocks noGrp="1" noRot="1" noChangeAspect="1"/>
+          </p:cNvSpPr>
+          <p:nvPr>
+            <p:ph type="sldImg"/>
+          </p:nvPr>
+        </p:nvSpPr>
+        <p:spPr/>
+      </p:sp>
+      <p:sp>
+        <p:nvSpPr>
+          <p:cNvPr id="3" name="Notes Placeholder 2"/>
+          <p:cNvSpPr>
+            <a:spLocks noGrp="1"/>
+          </p:cNvSpPr>
+          <p:nvPr>
+            <p:ph type="body" idx="1"/>
+          </p:nvPr>
+        </p:nvSpPr>
+        <p:spPr/>
+        <p:txBody>
+          <a:bodyPr/>
+          <a:lstStyle/>
+          <a:p>
+            <a:endParaRPr lang="en-US" dirty="0"/>
+          </a:p>
+        </p:txBody>
+      </p:sp>
+      <p:sp>
+        <p:nvSpPr>
+          <p:cNvPr id="4" name="Header Placeholder 3"/>
+          <p:cNvSpPr>
+            <a:spLocks noGrp="1"/>
+          </p:cNvSpPr>
+          <p:nvPr>
+            <p:ph type="hdr" sz="quarter" idx="10"/>
+          </p:nvPr>
+        </p:nvSpPr>
+        <p:spPr/>
+        <p:txBody>
+          <a:bodyPr/>
+          <a:lstStyle/>
+          <a:p>
+            <a:endParaRPr lang="en-US" dirty="0"/>
+          </a:p>
+        </p:txBody>
+      </p:sp>
+      <p:sp>
+        <p:nvSpPr>
+          <p:cNvPr id="5" name="Footer Placeholder 4"/>
+          <p:cNvSpPr>
+            <a:spLocks noGrp="1"/>
+          </p:cNvSpPr>
+          <p:nvPr>
+            <p:ph type="ftr" sz="quarter" idx="11"/>
+          </p:nvPr>
+        </p:nvSpPr>
+        <p:spPr/>
+        <p:txBody>
+          <a:bodyPr/>
+          <a:lstStyle/>
+          <a:p>
+            <a:pPr defTabSz="914099" eaLnBrk="0" hangingPunct="0"/>
+            <a:r>
+              <a:rPr lang="en-US" sz="400">
+                <a:gradFill>
+                  <a:gsLst>
+                    <a:gs pos="0">
+                      <a:prstClr val="black"/>
+                    </a:gs>
+                    <a:gs pos="100000">
+                      <a:prstClr val="black"/>
+                    </a:gs>
+                  </a:gsLst>
+                  <a:lin ang="5400000" scaled="0"/>
+                </a:gradFill>
+                <a:latin typeface="Segoe UI" pitchFamily="34" charset="0"/>
+                <a:ea typeface="Segoe UI" pitchFamily="34" charset="0"/>
+                <a:cs typeface="Segoe UI" pitchFamily="34" charset="0"/>
+              </a:rPr>
+              <a:t>© Microsoft Corporation. All rights reserved. MICROSOFT MAKES NO WARRANTIES, EXPRESS, IMPLIED OR STATUTORY, AS TO THE INFORMATION IN THIS PRESENTATION.</a:t>
+            </a:r>
+            <a:endParaRPr lang="en-US" sz="400" dirty="0">
+              <a:gradFill>
+                <a:gsLst>
+                  <a:gs pos="0">
+                    <a:prstClr val="black"/>
+                  </a:gs>
+                  <a:gs pos="100000">
+                    <a:prstClr val="black"/>
+                  </a:gs>
+                </a:gsLst>
+                <a:lin ang="5400000" scaled="0"/>
+              </a:gradFill>
+              <a:latin typeface="Segoe UI" pitchFamily="34" charset="0"/>
+              <a:ea typeface="Segoe UI" pitchFamily="34" charset="0"/>
+              <a:cs typeface="Segoe UI" pitchFamily="34" charset="0"/>
+            </a:endParaRPr>
+          </a:p>
+        </p:txBody>
+      </p:sp>
+      <p:sp>
+        <p:nvSpPr>
+          <p:cNvPr id="6" name="Date Placeholder 5"/>
+          <p:cNvSpPr>
+            <a:spLocks noGrp="1"/>
+          </p:cNvSpPr>
+          <p:nvPr>
+            <p:ph type="dt" idx="12"/>
+          </p:nvPr>
+        </p:nvSpPr>
+        <p:spPr/>
+        <p:txBody>
+          <a:bodyPr/>
+          <a:lstStyle/>
+          <a:p>
+            <a:fld id="{D18B56EA-E28F-4F92-9F16-7A6F2501B303}" type="datetime8">
+              <a:rPr lang="en-US" smtClean="0"/>
+              <a:t>3/6/20 3:29 PM</a:t>
+            </a:fld>
+            <a:endParaRPr lang="en-US" dirty="0"/>
+          </a:p>
+        </p:txBody>
+      </p:sp>
+      <p:sp>
+        <p:nvSpPr>
+          <p:cNvPr id="7" name="Slide Number Placeholder 6"/>
+          <p:cNvSpPr>
+            <a:spLocks noGrp="1"/>
+          </p:cNvSpPr>
+          <p:nvPr>
+            <p:ph type="sldNum" sz="quarter" idx="13"/>
+          </p:nvPr>
+        </p:nvSpPr>
+        <p:spPr/>
+        <p:txBody>
+          <a:bodyPr/>
+          <a:lstStyle/>
+          <a:p>
+            <a:fld id="{B4008EB6-D09E-4580-8CD6-DDB14511944F}" type="slidenum">
+              <a:rPr lang="en-US" smtClean="0"/>
+              <a:pPr/>
+              <a:t>10</a:t>
+            </a:fld>
+            <a:endParaRPr lang="en-US" dirty="0"/>
+          </a:p>
+        </p:txBody>
+      </p:sp>
+    </p:spTree>
+    <p:extLst>
+      <p:ext uri="{BB962C8B-B14F-4D97-AF65-F5344CB8AC3E}">
+        <p14:creationId xmlns:p14="http://schemas.microsoft.com/office/powerpoint/2010/main" val="3282806226"/>
       </p:ext>
     </p:extLst>
   </p:cSld>
@@ -24142,7 +25499,7 @@
       </a:lvl9pPr>
     </p:otherStyle>
   </p:txStyles>
-  <p:extLst mod="1">
+  <p:extLst>
     <p:ext uri="{27BBF7A9-308A-43DC-89C8-2F10F3537804}">
       <p15:sldGuideLst xmlns:p15="http://schemas.microsoft.com/office/powerpoint/2012/main">
         <p15:guide id="3" pos="1381" userDrawn="1">
@@ -25217,7 +26574,7 @@
         </p:xfrm>
         <a:graphic>
           <a:graphicData uri="http://schemas.openxmlformats.org/drawingml/2006/diagram">
-            <dgm:relIds xmlns:dgm="http://schemas.openxmlformats.org/drawingml/2006/diagram" xmlns:r="http://schemas.openxmlformats.org/officeDocument/2006/relationships" r:dm="rId2" r:lo="rId3" r:qs="rId4" r:cs="rId5"/>
+            <dgm:relIds xmlns:dgm="http://schemas.openxmlformats.org/drawingml/2006/diagram" xmlns:r="http://schemas.openxmlformats.org/officeDocument/2006/relationships" r:dm="rId3" r:lo="rId4" r:qs="rId5" r:cs="rId6"/>
           </a:graphicData>
         </a:graphic>
       </p:graphicFrame>
@@ -25311,7 +26668,7 @@
         </p:xfrm>
         <a:graphic>
           <a:graphicData uri="http://schemas.openxmlformats.org/drawingml/2006/diagram">
-            <dgm:relIds xmlns:dgm="http://schemas.openxmlformats.org/drawingml/2006/diagram" xmlns:r="http://schemas.openxmlformats.org/officeDocument/2006/relationships" r:dm="rId2" r:lo="rId3" r:qs="rId4" r:cs="rId5"/>
+            <dgm:relIds xmlns:dgm="http://schemas.openxmlformats.org/drawingml/2006/diagram" xmlns:r="http://schemas.openxmlformats.org/officeDocument/2006/relationships" r:dm="rId3" r:lo="rId4" r:qs="rId5" r:cs="rId6"/>
           </a:graphicData>
         </a:graphic>
       </p:graphicFrame>
@@ -25405,7 +26762,7 @@
         </p:xfrm>
         <a:graphic>
           <a:graphicData uri="http://schemas.openxmlformats.org/drawingml/2006/diagram">
-            <dgm:relIds xmlns:dgm="http://schemas.openxmlformats.org/drawingml/2006/diagram" xmlns:r="http://schemas.openxmlformats.org/officeDocument/2006/relationships" r:dm="rId2" r:lo="rId3" r:qs="rId4" r:cs="rId5"/>
+            <dgm:relIds xmlns:dgm="http://schemas.openxmlformats.org/drawingml/2006/diagram" xmlns:r="http://schemas.openxmlformats.org/officeDocument/2006/relationships" r:dm="rId3" r:lo="rId4" r:qs="rId5" r:cs="rId6"/>
           </a:graphicData>
         </a:graphic>
       </p:graphicFrame>
@@ -25643,7 +27000,7 @@
           <p:nvPr/>
         </p:nvPicPr>
         <p:blipFill rotWithShape="1">
-          <a:blip r:embed="rId2"/>
+          <a:blip r:embed="rId3"/>
           <a:srcRect r="26524"/>
           <a:stretch/>
         </p:blipFill>
@@ -25672,7 +27029,7 @@
           <p:nvPr/>
         </p:nvPicPr>
         <p:blipFill>
-          <a:blip r:embed="rId3"/>
+          <a:blip r:embed="rId4"/>
           <a:stretch>
             <a:fillRect/>
           </a:stretch>

</xml_diff>

<commit_message>
FY23Q2 refresh - sharepoint-spfx-deployment
- run through all exercise steps in associated MSLearn module to validate good working order
- updated steps & fixed typos where necessary
- updated slides where necessary
- update code samples to reflect MSLearn HOL exercise refresh & updates
- any & all users/names/company names/pictures/IDs are not real people/tenants... all are from M365 demo tenants provided by Microsoft
</commit_message>
<xml_diff>
--- a/01-intro.pptx
+++ b/01-intro.pptx
@@ -9829,7 +9829,7 @@
               <a:rPr lang="en-US" smtClean="0">
                 <a:latin typeface="Segoe UI" pitchFamily="34" charset="0"/>
               </a:rPr>
-              <a:t>4/30/2022 11:15 AM</a:t>
+              <a:t>11/19/2022 4:11 PM</a:t>
             </a:fld>
             <a:endParaRPr lang="en-US" dirty="0">
               <a:latin typeface="Segoe UI" pitchFamily="34" charset="0"/>
@@ -10126,7 +10126,7 @@
           <a:p>
             <a:fld id="{D18B56EA-E28F-4F92-9F16-7A6F2501B303}" type="datetime8">
               <a:rPr lang="en-US" smtClean="0"/>
-              <a:t>4/30/2022 11:15 AM</a:t>
+              <a:t>11/19/2022 4:11 PM</a:t>
             </a:fld>
             <a:endParaRPr lang="en-US" dirty="0"/>
           </a:p>
@@ -10509,7 +10509,7 @@
           <a:p>
             <a:fld id="{D18B56EA-E28F-4F92-9F16-7A6F2501B303}" type="datetime8">
               <a:rPr lang="en-US" smtClean="0"/>
-              <a:t>4/30/2022 11:15 AM</a:t>
+              <a:t>11/19/2022 4:11 PM</a:t>
             </a:fld>
             <a:endParaRPr lang="en-US" dirty="0"/>
           </a:p>
@@ -10690,7 +10690,7 @@
           <a:p>
             <a:fld id="{D18B56EA-E28F-4F92-9F16-7A6F2501B303}" type="datetime8">
               <a:rPr lang="en-US" smtClean="0"/>
-              <a:t>4/30/2022 11:15 AM</a:t>
+              <a:t>11/19/2022 4:11 PM</a:t>
             </a:fld>
             <a:endParaRPr lang="en-US" dirty="0"/>
           </a:p>
@@ -10871,7 +10871,7 @@
           <a:p>
             <a:fld id="{D18B56EA-E28F-4F92-9F16-7A6F2501B303}" type="datetime8">
               <a:rPr lang="en-US" smtClean="0"/>
-              <a:t>4/30/2022 11:15 AM</a:t>
+              <a:t>11/19/2022 4:11 PM</a:t>
             </a:fld>
             <a:endParaRPr lang="en-US" dirty="0"/>
           </a:p>
@@ -11052,7 +11052,7 @@
           <a:p>
             <a:fld id="{D18B56EA-E28F-4F92-9F16-7A6F2501B303}" type="datetime8">
               <a:rPr lang="en-US" smtClean="0"/>
-              <a:t>4/30/2022 11:15 AM</a:t>
+              <a:t>11/19/2022 4:11 PM</a:t>
             </a:fld>
             <a:endParaRPr lang="en-US" dirty="0"/>
           </a:p>
@@ -11236,7 +11236,7 @@
           <a:p>
             <a:fld id="{D18B56EA-E28F-4F92-9F16-7A6F2501B303}" type="datetime8">
               <a:rPr lang="en-US" smtClean="0"/>
-              <a:t>4/30/2022 11:15 AM</a:t>
+              <a:t>11/19/2022 4:11 PM</a:t>
             </a:fld>
             <a:endParaRPr lang="en-US" dirty="0"/>
           </a:p>
@@ -11906,7 +11906,7 @@
           <a:p>
             <a:fld id="{D18B56EA-E28F-4F92-9F16-7A6F2501B303}" type="datetime8">
               <a:rPr lang="en-US" smtClean="0"/>
-              <a:t>4/30/2022 11:15 AM</a:t>
+              <a:t>11/19/2022 4:11 PM</a:t>
             </a:fld>
             <a:endParaRPr lang="en-US" dirty="0"/>
           </a:p>
@@ -12209,7 +12209,7 @@
           <a:p>
             <a:fld id="{D18B56EA-E28F-4F92-9F16-7A6F2501B303}" type="datetime8">
               <a:rPr lang="en-US" smtClean="0"/>
-              <a:t>4/30/2022 11:15 AM</a:t>
+              <a:t>11/19/2022 4:11 PM</a:t>
             </a:fld>
             <a:endParaRPr lang="en-US" dirty="0"/>
           </a:p>
@@ -12495,7 +12495,7 @@
           <a:p>
             <a:fld id="{D18B56EA-E28F-4F92-9F16-7A6F2501B303}" type="datetime8">
               <a:rPr lang="en-US" smtClean="0"/>
-              <a:t>4/30/2022 11:15 AM</a:t>
+              <a:t>11/19/2022 4:11 PM</a:t>
             </a:fld>
             <a:endParaRPr lang="en-US" dirty="0"/>
           </a:p>
@@ -12733,7 +12733,7 @@
           <a:p>
             <a:fld id="{D18B56EA-E28F-4F92-9F16-7A6F2501B303}" type="datetime8">
               <a:rPr lang="en-US" smtClean="0"/>
-              <a:t>4/30/2022 11:16 AM</a:t>
+              <a:t>11/19/2022 4:11 PM</a:t>
             </a:fld>
             <a:endParaRPr lang="en-US" dirty="0"/>
           </a:p>
@@ -12985,7 +12985,7 @@
           <a:p>
             <a:fld id="{D18B56EA-E28F-4F92-9F16-7A6F2501B303}" type="datetime8">
               <a:rPr lang="en-US" smtClean="0"/>
-              <a:t>4/30/2022 11:15 AM</a:t>
+              <a:t>11/19/2022 4:11 PM</a:t>
             </a:fld>
             <a:endParaRPr lang="en-US" dirty="0"/>
           </a:p>
@@ -13166,7 +13166,7 @@
           <a:p>
             <a:fld id="{D18B56EA-E28F-4F92-9F16-7A6F2501B303}" type="datetime8">
               <a:rPr lang="en-US" smtClean="0"/>
-              <a:t>4/30/2022 11:15 AM</a:t>
+              <a:t>11/19/2022 4:11 PM</a:t>
             </a:fld>
             <a:endParaRPr lang="en-US" dirty="0"/>
           </a:p>
@@ -26643,7 +26643,7 @@
                 <a:latin typeface="+mj-lt"/>
                 <a:hlinkClick r:id="rId3"/>
               </a:rPr>
-              <a:t>https://docs.microsoft.com/en-us/sharepoint/dev/spfx/sharepoint-framework-overview</a:t>
+              <a:t>https://learn.microsoft.com/en-us/sharepoint/dev/spfx/sharepoint-framework-overview</a:t>
             </a:r>
             <a:endParaRPr lang="en-US" sz="1800" dirty="0">
               <a:latin typeface="+mj-lt"/>
@@ -26698,7 +26698,7 @@
                 <a:latin typeface="+mj-lt"/>
                 <a:hlinkClick r:id="rId4"/>
               </a:rPr>
-              <a:t>https://docs.microsoft.com/sharepoint/dev/spfx/web-parts/get-started/serve-your-web-part-in-a-sharepoint-page</a:t>
+              <a:t>https://learn.microsoft.com/sharepoint/dev/spfx/web-parts/get-started/serve-your-web-part-in-a-sharepoint-page</a:t>
             </a:r>
             <a:r>
               <a:rPr lang="en-US" sz="1600" dirty="0">

</xml_diff>